<commit_message>
Assignment 5 power point
</commit_message>
<xml_diff>
--- a/Assignments/Assignment5.pptx
+++ b/Assignments/Assignment5.pptx
@@ -8,6 +8,10 @@
     <p:sldId id="256" r:id="rId2"/>
     <p:sldId id="257" r:id="rId3"/>
     <p:sldId id="258" r:id="rId4"/>
+    <p:sldId id="259" r:id="rId5"/>
+    <p:sldId id="260" r:id="rId6"/>
+    <p:sldId id="261" r:id="rId7"/>
+    <p:sldId id="262" r:id="rId8"/>
   </p:sldIdLst>
   <p:sldSz cx="9144000" cy="6858000" type="screen4x3"/>
   <p:notesSz cx="6858000" cy="9144000"/>
@@ -14487,7 +14491,7 @@
         </p:blipFill>
         <p:spPr>
           <a:xfrm>
-            <a:off x="4729700" y="2644975"/>
+            <a:off x="5330538" y="2767866"/>
             <a:ext cx="2557357" cy="3121256"/>
           </a:xfrm>
           <a:prstGeom prst="rect">
@@ -14554,10 +14558,10 @@
               <a:t>GOALS			</a:t>
             </a:r>
             <a:r>
-              <a:rPr lang="en-US" sz="2000" i="1" dirty="0" smtClean="0"/>
+              <a:rPr lang="en-US" sz="2400" i="1" dirty="0" smtClean="0"/>
               <a:t>easy to Play,  tough to beat</a:t>
             </a:r>
-            <a:endParaRPr lang="en-US" sz="2000" i="1" dirty="0"/>
+            <a:endParaRPr lang="en-US" sz="2400" i="1" dirty="0"/>
           </a:p>
         </p:txBody>
       </p:sp>
@@ -14653,6 +14657,355 @@
     <p:extLst>
       <p:ext uri="{BB962C8B-B14F-4D97-AF65-F5344CB8AC3E}">
         <p14:creationId xmlns:p14="http://schemas.microsoft.com/office/powerpoint/2010/main" val="2422367663"/>
+      </p:ext>
+    </p:extLst>
+  </p:cSld>
+  <p:clrMapOvr>
+    <a:masterClrMapping/>
+  </p:clrMapOvr>
+  <p:timing>
+    <p:tnLst>
+      <p:par>
+        <p:cTn xmlns:p14="http://schemas.microsoft.com/office/powerpoint/2010/main" id="1" dur="indefinite" restart="never" nodeType="tmRoot"/>
+      </p:par>
+    </p:tnLst>
+  </p:timing>
+</p:sld>
+</file>
+
+<file path=ppt/slides/slide4.xml><?xml version="1.0" encoding="utf-8"?>
+<p:sld xmlns:a="http://schemas.openxmlformats.org/drawingml/2006/main" xmlns:r="http://schemas.openxmlformats.org/officeDocument/2006/relationships" xmlns:p="http://schemas.openxmlformats.org/presentationml/2006/main">
+  <p:cSld>
+    <p:spTree>
+      <p:nvGrpSpPr>
+        <p:cNvPr id="1" name=""/>
+        <p:cNvGrpSpPr/>
+        <p:nvPr/>
+      </p:nvGrpSpPr>
+      <p:grpSpPr>
+        <a:xfrm>
+          <a:off x="0" y="0"/>
+          <a:ext cx="0" cy="0"/>
+          <a:chOff x="0" y="0"/>
+          <a:chExt cx="0" cy="0"/>
+        </a:xfrm>
+      </p:grpSpPr>
+      <p:pic>
+        <p:nvPicPr>
+          <p:cNvPr id="5" name="Picture 4" descr="SSD_white.png"/>
+          <p:cNvPicPr>
+            <a:picLocks noChangeAspect="1"/>
+          </p:cNvPicPr>
+          <p:nvPr/>
+        </p:nvPicPr>
+        <p:blipFill>
+          <a:blip r:embed="rId2">
+            <a:extLst>
+              <a:ext uri="{28A0092B-C50C-407E-A947-70E740481C1C}">
+                <a14:useLocalDpi xmlns:a14="http://schemas.microsoft.com/office/drawing/2010/main" val="0"/>
+              </a:ext>
+            </a:extLst>
+          </a:blip>
+          <a:stretch>
+            <a:fillRect/>
+          </a:stretch>
+        </p:blipFill>
+        <p:spPr>
+          <a:xfrm>
+            <a:off x="0" y="-1"/>
+            <a:ext cx="9144000" cy="7209605"/>
+          </a:xfrm>
+          <a:prstGeom prst="rect">
+            <a:avLst/>
+          </a:prstGeom>
+        </p:spPr>
+      </p:pic>
+    </p:spTree>
+    <p:extLst>
+      <p:ext uri="{BB962C8B-B14F-4D97-AF65-F5344CB8AC3E}">
+        <p14:creationId xmlns:p14="http://schemas.microsoft.com/office/powerpoint/2010/main" val="1265246952"/>
+      </p:ext>
+    </p:extLst>
+  </p:cSld>
+  <p:clrMapOvr>
+    <a:masterClrMapping/>
+  </p:clrMapOvr>
+  <p:timing>
+    <p:tnLst>
+      <p:par>
+        <p:cTn xmlns:p14="http://schemas.microsoft.com/office/powerpoint/2010/main" id="1" dur="indefinite" restart="never" nodeType="tmRoot"/>
+      </p:par>
+    </p:tnLst>
+  </p:timing>
+</p:sld>
+</file>
+
+<file path=ppt/slides/slide5.xml><?xml version="1.0" encoding="utf-8"?>
+<p:sld xmlns:a="http://schemas.openxmlformats.org/drawingml/2006/main" xmlns:r="http://schemas.openxmlformats.org/officeDocument/2006/relationships" xmlns:p="http://schemas.openxmlformats.org/presentationml/2006/main">
+  <p:cSld>
+    <p:spTree>
+      <p:nvGrpSpPr>
+        <p:cNvPr id="1" name=""/>
+        <p:cNvGrpSpPr/>
+        <p:nvPr/>
+      </p:nvGrpSpPr>
+      <p:grpSpPr>
+        <a:xfrm>
+          <a:off x="0" y="0"/>
+          <a:ext cx="0" cy="0"/>
+          <a:chOff x="0" y="0"/>
+          <a:chExt cx="0" cy="0"/>
+        </a:xfrm>
+      </p:grpSpPr>
+      <p:pic>
+        <p:nvPicPr>
+          <p:cNvPr id="4" name="Picture 3" descr="ClassDiagram_white.png"/>
+          <p:cNvPicPr>
+            <a:picLocks noChangeAspect="1"/>
+          </p:cNvPicPr>
+          <p:nvPr/>
+        </p:nvPicPr>
+        <p:blipFill>
+          <a:blip r:embed="rId2">
+            <a:extLst>
+              <a:ext uri="{28A0092B-C50C-407E-A947-70E740481C1C}">
+                <a14:useLocalDpi xmlns:a14="http://schemas.microsoft.com/office/drawing/2010/main" val="0"/>
+              </a:ext>
+            </a:extLst>
+          </a:blip>
+          <a:stretch>
+            <a:fillRect/>
+          </a:stretch>
+        </p:blipFill>
+        <p:spPr>
+          <a:xfrm>
+            <a:off x="0" y="-1"/>
+            <a:ext cx="9144000" cy="7086715"/>
+          </a:xfrm>
+          <a:prstGeom prst="rect">
+            <a:avLst/>
+          </a:prstGeom>
+        </p:spPr>
+      </p:pic>
+    </p:spTree>
+    <p:extLst>
+      <p:ext uri="{BB962C8B-B14F-4D97-AF65-F5344CB8AC3E}">
+        <p14:creationId xmlns:p14="http://schemas.microsoft.com/office/powerpoint/2010/main" val="84712626"/>
+      </p:ext>
+    </p:extLst>
+  </p:cSld>
+  <p:clrMapOvr>
+    <a:masterClrMapping/>
+  </p:clrMapOvr>
+  <p:timing>
+    <p:tnLst>
+      <p:par>
+        <p:cTn xmlns:p14="http://schemas.microsoft.com/office/powerpoint/2010/main" id="1" dur="indefinite" restart="never" nodeType="tmRoot"/>
+      </p:par>
+    </p:tnLst>
+  </p:timing>
+</p:sld>
+</file>
+
+<file path=ppt/slides/slide6.xml><?xml version="1.0" encoding="utf-8"?>
+<p:sld xmlns:a="http://schemas.openxmlformats.org/drawingml/2006/main" xmlns:r="http://schemas.openxmlformats.org/officeDocument/2006/relationships" xmlns:p="http://schemas.openxmlformats.org/presentationml/2006/main">
+  <p:cSld>
+    <p:spTree>
+      <p:nvGrpSpPr>
+        <p:cNvPr id="1" name=""/>
+        <p:cNvGrpSpPr/>
+        <p:nvPr/>
+      </p:nvGrpSpPr>
+      <p:grpSpPr>
+        <a:xfrm>
+          <a:off x="0" y="0"/>
+          <a:ext cx="0" cy="0"/>
+          <a:chOff x="0" y="0"/>
+          <a:chExt cx="0" cy="0"/>
+        </a:xfrm>
+      </p:grpSpPr>
+      <p:sp>
+        <p:nvSpPr>
+          <p:cNvPr id="4" name="Title 3"/>
+          <p:cNvSpPr>
+            <a:spLocks noGrp="1"/>
+          </p:cNvSpPr>
+          <p:nvPr>
+            <p:ph type="title"/>
+          </p:nvPr>
+        </p:nvSpPr>
+        <p:spPr>
+          <a:xfrm>
+            <a:off x="613069" y="1452562"/>
+            <a:ext cx="7772400" cy="1362075"/>
+          </a:xfrm>
+        </p:spPr>
+        <p:txBody>
+          <a:bodyPr>
+            <a:normAutofit/>
+          </a:bodyPr>
+          <a:lstStyle/>
+          <a:p>
+            <a:r>
+              <a:rPr lang="en-US" sz="5400" dirty="0" smtClean="0"/>
+              <a:t>Level One</a:t>
+            </a:r>
+            <a:endParaRPr lang="en-US" sz="5400" dirty="0"/>
+          </a:p>
+        </p:txBody>
+      </p:sp>
+      <p:sp>
+        <p:nvSpPr>
+          <p:cNvPr id="5" name="Text Placeholder 4"/>
+          <p:cNvSpPr>
+            <a:spLocks noGrp="1"/>
+          </p:cNvSpPr>
+          <p:nvPr>
+            <p:ph type="body" idx="1"/>
+          </p:nvPr>
+        </p:nvSpPr>
+        <p:spPr>
+          <a:xfrm>
+            <a:off x="148785" y="2133600"/>
+            <a:ext cx="8809159" cy="1500187"/>
+          </a:xfrm>
+        </p:spPr>
+        <p:txBody>
+          <a:bodyPr>
+            <a:normAutofit/>
+          </a:bodyPr>
+          <a:lstStyle/>
+          <a:p>
+            <a:pPr lvl="8"/>
+            <a:r>
+              <a:rPr lang="en-US" sz="2800" dirty="0" smtClean="0"/>
+              <a:t>http://</a:t>
+            </a:r>
+            <a:r>
+              <a:rPr lang="en-US" sz="2800" dirty="0" err="1" smtClean="0"/>
+              <a:t>cs.ucsb.edu</a:t>
+            </a:r>
+            <a:r>
+              <a:rPr lang="en-US" sz="2800" dirty="0" smtClean="0"/>
+              <a:t>/~</a:t>
+            </a:r>
+            <a:r>
+              <a:rPr lang="en-US" sz="2800" dirty="0" err="1" smtClean="0"/>
+              <a:t>andrewberls</a:t>
+            </a:r>
+            <a:endParaRPr lang="en-US" sz="2800" dirty="0"/>
+          </a:p>
+        </p:txBody>
+      </p:sp>
+    </p:spTree>
+    <p:extLst>
+      <p:ext uri="{BB962C8B-B14F-4D97-AF65-F5344CB8AC3E}">
+        <p14:creationId xmlns:p14="http://schemas.microsoft.com/office/powerpoint/2010/main" val="3088195751"/>
+      </p:ext>
+    </p:extLst>
+  </p:cSld>
+  <p:clrMapOvr>
+    <a:masterClrMapping/>
+  </p:clrMapOvr>
+  <p:timing>
+    <p:tnLst>
+      <p:par>
+        <p:cTn xmlns:p14="http://schemas.microsoft.com/office/powerpoint/2010/main" id="1" dur="indefinite" restart="never" nodeType="tmRoot"/>
+      </p:par>
+    </p:tnLst>
+  </p:timing>
+</p:sld>
+</file>
+
+<file path=ppt/slides/slide7.xml><?xml version="1.0" encoding="utf-8"?>
+<p:sld xmlns:a="http://schemas.openxmlformats.org/drawingml/2006/main" xmlns:r="http://schemas.openxmlformats.org/officeDocument/2006/relationships" xmlns:p="http://schemas.openxmlformats.org/presentationml/2006/main">
+  <p:cSld>
+    <p:spTree>
+      <p:nvGrpSpPr>
+        <p:cNvPr id="1" name=""/>
+        <p:cNvGrpSpPr/>
+        <p:nvPr/>
+      </p:nvGrpSpPr>
+      <p:grpSpPr>
+        <a:xfrm>
+          <a:off x="0" y="0"/>
+          <a:ext cx="0" cy="0"/>
+          <a:chOff x="0" y="0"/>
+          <a:chExt cx="0" cy="0"/>
+        </a:xfrm>
+      </p:grpSpPr>
+      <p:sp>
+        <p:nvSpPr>
+          <p:cNvPr id="2" name="Title 1"/>
+          <p:cNvSpPr>
+            <a:spLocks noGrp="1"/>
+          </p:cNvSpPr>
+          <p:nvPr>
+            <p:ph type="title"/>
+          </p:nvPr>
+        </p:nvSpPr>
+        <p:spPr/>
+        <p:txBody>
+          <a:bodyPr>
+            <a:normAutofit/>
+          </a:bodyPr>
+          <a:lstStyle/>
+          <a:p>
+            <a:r>
+              <a:rPr lang="en-US" sz="4400" i="1" dirty="0" smtClean="0"/>
+              <a:t>THE FUTURE</a:t>
+            </a:r>
+            <a:endParaRPr lang="en-US" sz="4400" i="1" dirty="0"/>
+          </a:p>
+        </p:txBody>
+      </p:sp>
+      <p:sp>
+        <p:nvSpPr>
+          <p:cNvPr id="4" name="Content Placeholder 3"/>
+          <p:cNvSpPr>
+            <a:spLocks noGrp="1"/>
+          </p:cNvSpPr>
+          <p:nvPr>
+            <p:ph idx="1"/>
+          </p:nvPr>
+        </p:nvSpPr>
+        <p:spPr/>
+        <p:txBody>
+          <a:bodyPr>
+            <a:normAutofit/>
+          </a:bodyPr>
+          <a:lstStyle/>
+          <a:p>
+            <a:r>
+              <a:rPr lang="en-US" sz="3600" dirty="0" smtClean="0"/>
+              <a:t>More levels</a:t>
+            </a:r>
+          </a:p>
+          <a:p>
+            <a:r>
+              <a:rPr lang="en-US" sz="3600" dirty="0" smtClean="0"/>
+              <a:t>More enemies</a:t>
+            </a:r>
+          </a:p>
+          <a:p>
+            <a:r>
+              <a:rPr lang="en-US" sz="3600" dirty="0" smtClean="0"/>
+              <a:t>More power-ups</a:t>
+            </a:r>
+          </a:p>
+          <a:p>
+            <a:r>
+              <a:rPr lang="en-US" sz="3600" dirty="0" smtClean="0"/>
+              <a:t>MORE DESTRUCTION</a:t>
+            </a:r>
+            <a:endParaRPr lang="en-US" sz="3600" dirty="0"/>
+          </a:p>
+        </p:txBody>
+      </p:sp>
+    </p:spTree>
+    <p:extLst>
+      <p:ext uri="{BB962C8B-B14F-4D97-AF65-F5344CB8AC3E}">
+        <p14:creationId xmlns:p14="http://schemas.microsoft.com/office/powerpoint/2010/main" val="3406383432"/>
       </p:ext>
     </p:extLst>
   </p:cSld>

</xml_diff>